<commit_message>
IDE 14 für Promotion überarbeitet
</commit_message>
<xml_diff>
--- a/training-cards/music moves/Ideas (IDE)/ger/apprentice/ger_IDE_14_Ideen_weiterspinnen_MM_A.pptx
+++ b/training-cards/music moves/Ideas (IDE)/ger/apprentice/ger_IDE_14_Ideen_weiterspinnen_MM_A.pptx
@@ -105,6 +105,22 @@
       </a:defRPr>
     </a:lvl9pPr>
   </p:defaultTextStyle>
+  <p:extLst>
+    <p:ext uri="{EFAFB233-063F-42B5-8137-9DF3F51BA10A}">
+      <p15:sldGuideLst xmlns:p15="http://schemas.microsoft.com/office/powerpoint/2012/main">
+        <p15:guide id="1" orient="horz" pos="652">
+          <p15:clr>
+            <a:srgbClr val="A4A3A4"/>
+          </p15:clr>
+        </p15:guide>
+        <p15:guide id="2">
+          <p15:clr>
+            <a:srgbClr val="A4A3A4"/>
+          </p15:clr>
+        </p15:guide>
+      </p15:sldGuideLst>
+    </p:ext>
+  </p:extLst>
 </p:presentation>
 </file>
 
@@ -153,10 +169,9 @@
           </a:lstStyle>
           <a:p>
             <a:r>
-              <a:rPr lang="de-DE" dirty="0" smtClean="0"/>
+              <a:rPr lang="de-DE" dirty="0"/>
               <a:t>TITEL HINZUFÜGEN</a:t>
             </a:r>
-            <a:endParaRPr lang="de-DE" dirty="0"/>
           </a:p>
         </p:txBody>
       </p:sp>
@@ -187,35 +202,35 @@
           <a:p>
             <a:pPr lvl="0"/>
             <a:r>
-              <a:rPr lang="de-DE" smtClean="0"/>
+              <a:rPr lang="de-DE"/>
               <a:t>Mastertextformat bearbeiten</a:t>
             </a:r>
           </a:p>
           <a:p>
             <a:pPr lvl="1"/>
             <a:r>
-              <a:rPr lang="de-DE" smtClean="0"/>
+              <a:rPr lang="de-DE"/>
               <a:t>Zweite Ebene</a:t>
             </a:r>
           </a:p>
           <a:p>
             <a:pPr lvl="2"/>
             <a:r>
-              <a:rPr lang="de-DE" smtClean="0"/>
+              <a:rPr lang="de-DE"/>
               <a:t>Dritte Ebene</a:t>
             </a:r>
           </a:p>
           <a:p>
             <a:pPr lvl="3"/>
             <a:r>
-              <a:rPr lang="de-DE" smtClean="0"/>
+              <a:rPr lang="de-DE"/>
               <a:t>Vierte Ebene</a:t>
             </a:r>
           </a:p>
           <a:p>
             <a:pPr lvl="4"/>
             <a:r>
-              <a:rPr lang="de-DE" smtClean="0"/>
+              <a:rPr lang="de-DE"/>
               <a:t>Fünfte Ebene</a:t>
             </a:r>
             <a:endParaRPr lang="de-DE" dirty="0"/>
@@ -262,7 +277,7 @@
               <a:buNone/>
             </a:pPr>
             <a:r>
-              <a:rPr lang="de-DE" smtClean="0"/>
+              <a:rPr lang="de-DE"/>
               <a:t>Master-Untertitelformat bearbeiten</a:t>
             </a:r>
             <a:endParaRPr lang="de-DE" dirty="0"/>
@@ -378,35 +393,35 @@
           <a:p>
             <a:pPr lvl="0"/>
             <a:r>
-              <a:rPr lang="de-DE" smtClean="0"/>
+              <a:rPr lang="de-DE"/>
               <a:t>Mastertextformat bearbeiten</a:t>
             </a:r>
           </a:p>
           <a:p>
             <a:pPr lvl="1"/>
             <a:r>
-              <a:rPr lang="de-DE" smtClean="0"/>
+              <a:rPr lang="de-DE"/>
               <a:t>Zweite Ebene</a:t>
             </a:r>
           </a:p>
           <a:p>
             <a:pPr lvl="2"/>
             <a:r>
-              <a:rPr lang="de-DE" smtClean="0"/>
+              <a:rPr lang="de-DE"/>
               <a:t>Dritte Ebene</a:t>
             </a:r>
           </a:p>
           <a:p>
             <a:pPr lvl="3"/>
             <a:r>
-              <a:rPr lang="de-DE" smtClean="0"/>
+              <a:rPr lang="de-DE"/>
               <a:t>Vierte Ebene</a:t>
             </a:r>
           </a:p>
           <a:p>
             <a:pPr lvl="4"/>
             <a:r>
-              <a:rPr lang="de-DE" smtClean="0"/>
+              <a:rPr lang="de-DE"/>
               <a:t>Fünfte Ebene</a:t>
             </a:r>
             <a:endParaRPr lang="de-DE" dirty="0"/>
@@ -436,7 +451,7 @@
           <a:lstStyle/>
           <a:p>
             <a:r>
-              <a:rPr lang="de-DE" sz="2400" dirty="0" smtClean="0">
+              <a:rPr lang="de-DE" sz="2400" dirty="0">
                 <a:solidFill>
                   <a:srgbClr val="7E006B"/>
                 </a:solidFill>
@@ -446,7 +461,7 @@
               <a:t>TRAININGS</a:t>
             </a:r>
             <a:r>
-              <a:rPr lang="de-DE" sz="2400" dirty="0" smtClean="0">
+              <a:rPr lang="de-DE" sz="2400" dirty="0">
                 <a:solidFill>
                   <a:srgbClr val="7E006B"/>
                 </a:solidFill>
@@ -514,7 +529,7 @@
           </a:ln>
           <a:extLst>
             <a:ext uri="{C572A759-6A51-4108-AA02-DFA0A04FC94B}">
-              <ma14:wrappingTextBoxFlag xmlns:ma14="http://schemas.microsoft.com/office/mac/drawingml/2011/main" val="1"/>
+              <ma14:wrappingTextBoxFlag xmlns:ma14="http://schemas.microsoft.com/office/mac/drawingml/2011/main" xmlns="" val="1"/>
             </a:ext>
           </a:extLst>
         </p:spPr>
@@ -560,9 +575,7 @@
           <p:nvPr userDrawn="1"/>
         </p:nvPicPr>
         <p:blipFill>
-          <a:blip r:embed="rId4">
-            <a:extLst/>
-          </a:blip>
+          <a:blip r:embed="rId4"/>
           <a:stretch>
             <a:fillRect/>
           </a:stretch>
@@ -620,7 +633,7 @@
                 <a:latin typeface="Avenir Light"/>
                 <a:cs typeface="Avenir Light"/>
               </a:rPr>
-              <a:t>24.01.16</a:t>
+              <a:t>20.07.23</a:t>
             </a:fld>
             <a:endParaRPr lang="de-DE" sz="600" dirty="0">
               <a:solidFill>
@@ -678,10 +691,9 @@
           <a:lstStyle/>
           <a:p>
             <a:r>
-              <a:rPr lang="de-DE" smtClean="0"/>
+              <a:rPr lang="de-DE"/>
               <a:t>Mastertitelformat bearbeiten</a:t>
             </a:r>
-            <a:endParaRPr lang="de-DE"/>
           </a:p>
         </p:txBody>
       </p:sp>
@@ -702,7 +714,7 @@
           <a:p>
             <a:fld id="{FF5B2BAF-DF38-0A48-A798-0C06E514FD52}" type="datetimeFigureOut">
               <a:rPr lang="de-DE" smtClean="0"/>
-              <a:t>24.01.16</a:t>
+              <a:t>20.07.23</a:t>
             </a:fld>
             <a:endParaRPr lang="de-DE" dirty="0"/>
           </a:p>
@@ -813,17 +825,16 @@
           <a:p>
             <a:pPr marL="0" lvl="0" algn="l"/>
             <a:r>
-              <a:rPr lang="de-DE" dirty="0" smtClean="0"/>
+              <a:rPr lang="de-DE" dirty="0"/>
               <a:t>Überschrift </a:t>
             </a:r>
             <a:br>
-              <a:rPr lang="de-DE" dirty="0" smtClean="0"/>
+              <a:rPr lang="de-DE" dirty="0"/>
             </a:br>
             <a:r>
-              <a:rPr lang="de-DE" dirty="0" smtClean="0"/>
+              <a:rPr lang="de-DE" dirty="0"/>
               <a:t>bearbeiten </a:t>
             </a:r>
-            <a:endParaRPr lang="de-DE" dirty="0"/>
           </a:p>
         </p:txBody>
       </p:sp>
@@ -854,38 +865,37 @@
           <a:p>
             <a:pPr lvl="0"/>
             <a:r>
-              <a:rPr lang="de-DE" dirty="0" smtClean="0"/>
+              <a:rPr lang="de-DE" dirty="0"/>
               <a:t>Mastertextformat bearbeiten</a:t>
             </a:r>
           </a:p>
           <a:p>
             <a:pPr lvl="1"/>
             <a:r>
-              <a:rPr lang="de-DE" dirty="0" smtClean="0"/>
+              <a:rPr lang="de-DE" dirty="0"/>
               <a:t>Zweite Ebene</a:t>
             </a:r>
           </a:p>
           <a:p>
             <a:pPr lvl="2"/>
             <a:r>
-              <a:rPr lang="de-DE" dirty="0" smtClean="0"/>
+              <a:rPr lang="de-DE" dirty="0"/>
               <a:t>Dritte Ebene</a:t>
             </a:r>
           </a:p>
           <a:p>
             <a:pPr lvl="3"/>
             <a:r>
-              <a:rPr lang="de-DE" dirty="0" smtClean="0"/>
+              <a:rPr lang="de-DE" dirty="0"/>
               <a:t>Vierte Ebene</a:t>
             </a:r>
           </a:p>
           <a:p>
             <a:pPr lvl="4"/>
             <a:r>
-              <a:rPr lang="de-DE" dirty="0" smtClean="0"/>
+              <a:rPr lang="de-DE" dirty="0"/>
               <a:t>Fünfte Ebene</a:t>
             </a:r>
-            <a:endParaRPr lang="de-DE" dirty="0"/>
           </a:p>
         </p:txBody>
       </p:sp>
@@ -924,7 +934,7 @@
           <a:p>
             <a:fld id="{FF5B2BAF-DF38-0A48-A798-0C06E514FD52}" type="datetimeFigureOut">
               <a:rPr lang="de-DE" smtClean="0"/>
-              <a:t>24.01.16</a:t>
+              <a:t>20.07.23</a:t>
             </a:fld>
             <a:endParaRPr lang="de-DE" dirty="0"/>
           </a:p>
@@ -1158,7 +1168,7 @@
           <a:lstStyle/>
           <a:p>
             <a:r>
-              <a:rPr lang="de-DE" sz="1050" b="1" dirty="0" smtClean="0">
+              <a:rPr lang="de-DE" sz="1050" b="1" dirty="0">
                 <a:solidFill>
                   <a:schemeClr val="bg1"/>
                 </a:solidFill>
@@ -1168,7 +1178,7 @@
               <a:t>TRAININGSKARTE</a:t>
             </a:r>
             <a:r>
-              <a:rPr lang="de-DE" sz="1050" dirty="0" smtClean="0">
+              <a:rPr lang="de-DE" sz="1050" dirty="0">
                 <a:solidFill>
                   <a:schemeClr val="bg1"/>
                 </a:solidFill>
@@ -1178,7 +1188,7 @@
               <a:t> </a:t>
             </a:r>
             <a:r>
-              <a:rPr lang="de-DE" sz="1050" b="1" dirty="0" smtClean="0">
+              <a:rPr lang="de-DE" sz="1050" b="1" dirty="0">
                 <a:solidFill>
                   <a:schemeClr val="bg1"/>
                 </a:solidFill>
@@ -1187,13 +1197,6 @@
               </a:rPr>
               <a:t>IDE 14</a:t>
             </a:r>
-            <a:endParaRPr lang="de-DE" sz="1050" b="1" dirty="0">
-              <a:solidFill>
-                <a:schemeClr val="bg1"/>
-              </a:solidFill>
-              <a:latin typeface="Avenir Heavy"/>
-              <a:cs typeface="Avenir Heavy"/>
-            </a:endParaRPr>
           </a:p>
         </p:txBody>
       </p:sp>
@@ -1576,17 +1579,16 @@
           <a:lstStyle/>
           <a:p>
             <a:r>
-              <a:rPr lang="de-DE" dirty="0" smtClean="0">
+              <a:rPr lang="de-DE" dirty="0">
                 <a:latin typeface="Avenir Heavy"/>
                 <a:cs typeface="Avenir Heavy"/>
               </a:rPr>
               <a:t>IDEEN </a:t>
             </a:r>
             <a:r>
-              <a:rPr lang="de-DE" dirty="0" smtClean="0"/>
+              <a:rPr lang="de-DE" dirty="0"/>
               <a:t>WEITERSPINNEN</a:t>
             </a:r>
-            <a:endParaRPr lang="de-DE" dirty="0"/>
           </a:p>
         </p:txBody>
       </p:sp>
@@ -1635,7 +1637,7 @@
           <a:p>
             <a:r>
               <a:rPr lang="de-DE" sz="1100" dirty="0"/>
-              <a:t>Manchmal folgt einer Idee eine andere auf dem Fuße, die man dann dazuschreiben kann. Wenn Du z.B. eine musikalische Idee hast von einer Melodielinie, fällt dir vielleicht noch eine Bassstimme dazu ein. </a:t>
+              <a:t>Manchmal folgt einer Idee eine andere auf dem Fuße, die man dann dazuschreiben kann. Wenn Du z.B. eine musikalische Idee von einer Melodielinie hast, fällt dir vielleicht noch eine Bassstimme dazu ein. </a:t>
             </a:r>
           </a:p>
           <a:p>
@@ -1671,7 +1673,6 @@
               <a:rPr lang="de-DE" sz="1100" dirty="0"/>
               <a:t>Welche Form auch immer Du wählst, sie bringt mehr Tiefe in Deine Ideen und legt eine Verbindung zu Deinem Alltag. Ideen werden konkreter und angreifbarer.</a:t>
             </a:r>
-            <a:endParaRPr lang="de-DE" sz="1100" dirty="0"/>
           </a:p>
         </p:txBody>
       </p:sp>
@@ -1694,10 +1695,9 @@
               <a:buNone/>
             </a:pPr>
             <a:r>
-              <a:rPr lang="de-DE" dirty="0" smtClean="0"/>
+              <a:rPr lang="de-DE" dirty="0"/>
               <a:t>Regina Brandhuber</a:t>
             </a:r>
-            <a:endParaRPr lang="de-DE" dirty="0"/>
           </a:p>
         </p:txBody>
       </p:sp>
@@ -1748,15 +1748,22 @@
           <a:p>
             <a:r>
               <a:rPr lang="de-DE" dirty="0"/>
-              <a:t>Nimm Dir in 2 Wochen 4 Ideen zur Hand und vertiefe sie, indem Du sie entweder genauer aufschreibst, Folgeideen dazuschreibst, Dir ihre Umsetzung überlegst oder sie sauberer dokumentierst.</a:t>
+              <a:t>Nimm Dir in 2 Wochen 4 Ideen zur Hand und vertiefe sie, indem Du sie entweder genauer aufschreibst, Folgeideen dazuschreibst, Dir ihre Umsetzung überlegst oder sie ausgereifter dokumentierst.</a:t>
             </a:r>
           </a:p>
           <a:p>
             <a:r>
               <a:rPr lang="de-DE" dirty="0"/>
-              <a:t>Zeige Deine ausgereifteren Ideen Deinem Team und lass sie von ihm zertifizieren.</a:t>
-            </a:r>
-            <a:endParaRPr lang="de-DE" dirty="0"/>
+              <a:t>Zeige </a:t>
+            </a:r>
+            <a:r>
+              <a:rPr lang="de-DE"/>
+              <a:t>Deine überarbeiteten </a:t>
+            </a:r>
+            <a:r>
+              <a:rPr lang="de-DE" dirty="0"/>
+              <a:t>Ideen Deinem Team und lass sie von ihm zertifizieren.</a:t>
+            </a:r>
           </a:p>
         </p:txBody>
       </p:sp>

</xml_diff>

<commit_message>
IDE 14 und IDE 15 Lizenzen erneuert
</commit_message>
<xml_diff>
--- a/training-cards/music moves/Ideas (IDE)/ger/apprentice/ger_IDE_14_Ideen_weiterspinnen_MM_A.pptx
+++ b/training-cards/music moves/Ideas (IDE)/ger/apprentice/ger_IDE_14_Ideen_weiterspinnen_MM_A.pptx
@@ -512,14 +512,20 @@
       </p:pic>
       <p:sp>
         <p:nvSpPr>
-          <p:cNvPr id="5" name="Shape 7"/>
+          <p:cNvPr id="4" name="Shape 7">
+            <a:extLst>
+              <a:ext uri="{FF2B5EF4-FFF2-40B4-BE49-F238E27FC236}">
+                <a16:creationId xmlns:a16="http://schemas.microsoft.com/office/drawing/2014/main" id="{B36F37AE-0613-DB7F-476B-34A55A59DD31}"/>
+              </a:ext>
+            </a:extLst>
+          </p:cNvPr>
           <p:cNvSpPr/>
           <p:nvPr userDrawn="1"/>
         </p:nvSpPr>
         <p:spPr>
           <a:xfrm>
-            <a:off x="1683417" y="4952581"/>
-            <a:ext cx="4196016" cy="276995"/>
+            <a:off x="971550" y="4689585"/>
+            <a:ext cx="4691860" cy="461661"/>
           </a:xfrm>
           <a:prstGeom prst="rect">
             <a:avLst/>
@@ -529,12 +535,12 @@
           </a:ln>
           <a:extLst>
             <a:ext uri="{C572A759-6A51-4108-AA02-DFA0A04FC94B}">
-              <ma14:wrappingTextBoxFlag xmlns:ma14="http://schemas.microsoft.com/office/mac/drawingml/2011/main" xmlns="" val="1"/>
+              <ma14:wrappingTextBoxFlag xmlns="" xmlns:ma14="http://schemas.microsoft.com/office/mac/drawingml/2011/main" val="1"/>
             </a:ext>
           </a:extLst>
         </p:spPr>
         <p:txBody>
-          <a:bodyPr wrap="none" lIns="45718" tIns="45718" rIns="45718" bIns="45718">
+          <a:bodyPr wrap="square" lIns="45718" tIns="45718" rIns="45718" bIns="45718">
             <a:spAutoFit/>
           </a:bodyPr>
           <a:lstStyle/>
@@ -543,47 +549,266 @@
               <a:defRPr sz="1800"/>
             </a:pPr>
             <a:r>
-              <a:rPr sz="600" dirty="0">
-                <a:latin typeface="Avenir Light"/>
+              <a:rPr lang="de-DE" sz="800" b="0" i="0" u="none" strike="noStrike" dirty="0" err="1">
+                <a:solidFill>
+                  <a:schemeClr val="tx1">
+                    <a:lumMod val="65000"/>
+                    <a:lumOff val="35000"/>
+                  </a:schemeClr>
+                </a:solidFill>
+                <a:effectLst/>
+                <a:latin typeface="Avenir Book" panose="02000503020000020003" pitchFamily="2" charset="0"/>
+              </a:rPr>
+              <a:t>music</a:t>
+            </a:r>
+            <a:r>
+              <a:rPr lang="de-DE" sz="800" b="0" i="0" u="none" strike="noStrike" dirty="0">
+                <a:solidFill>
+                  <a:schemeClr val="tx1">
+                    <a:lumMod val="65000"/>
+                    <a:lumOff val="35000"/>
+                  </a:schemeClr>
+                </a:solidFill>
+                <a:effectLst/>
+                <a:latin typeface="Avenir Book" panose="02000503020000020003" pitchFamily="2" charset="0"/>
+              </a:rPr>
+              <a:t> </a:t>
+            </a:r>
+            <a:r>
+              <a:rPr lang="de-DE" sz="800" b="0" i="0" u="none" strike="noStrike" dirty="0" err="1">
+                <a:solidFill>
+                  <a:schemeClr val="tx1">
+                    <a:lumMod val="65000"/>
+                    <a:lumOff val="35000"/>
+                  </a:schemeClr>
+                </a:solidFill>
+                <a:effectLst/>
+                <a:latin typeface="Avenir Book" panose="02000503020000020003" pitchFamily="2" charset="0"/>
+              </a:rPr>
+              <a:t>moves</a:t>
+            </a:r>
+            <a:r>
+              <a:rPr lang="de-DE" sz="800" b="0" i="0" u="none" strike="noStrike" dirty="0">
+                <a:solidFill>
+                  <a:schemeClr val="tx1">
+                    <a:lumMod val="65000"/>
+                    <a:lumOff val="35000"/>
+                  </a:schemeClr>
+                </a:solidFill>
+                <a:effectLst/>
+                <a:latin typeface="Avenir Book" panose="02000503020000020003" pitchFamily="2" charset="0"/>
+              </a:rPr>
+              <a:t>-Trainingskarten von Regina Brandhuber sind lizenziert unter einer Creative Commons </a:t>
+            </a:r>
+          </a:p>
+          <a:p>
+            <a:pPr lvl="0" algn="ctr">
+              <a:defRPr sz="1800"/>
+            </a:pPr>
+            <a:r>
+              <a:rPr lang="de-DE" sz="800" b="0" i="0" u="none" strike="noStrike" dirty="0">
+                <a:solidFill>
+                  <a:schemeClr val="tx1">
+                    <a:lumMod val="65000"/>
+                    <a:lumOff val="35000"/>
+                  </a:schemeClr>
+                </a:solidFill>
+                <a:effectLst/>
+                <a:latin typeface="Avenir Book" panose="02000503020000020003" pitchFamily="2" charset="0"/>
+              </a:rPr>
+              <a:t>Namensnennung-Nicht kommerziell 4.0 International Lizenz.</a:t>
+            </a:r>
+          </a:p>
+          <a:p>
+            <a:pPr lvl="0" algn="ctr">
+              <a:defRPr sz="1800"/>
+            </a:pPr>
+            <a:r>
+              <a:rPr lang="de-DE" sz="800" dirty="0">
+                <a:solidFill>
+                  <a:schemeClr val="tx1">
+                    <a:lumMod val="65000"/>
+                    <a:lumOff val="35000"/>
+                  </a:schemeClr>
+                </a:solidFill>
+                <a:latin typeface="Avenir Book" panose="02000503020000020003" pitchFamily="2" charset="0"/>
                 <a:ea typeface="Calibri"/>
                 <a:cs typeface="Avenir Light"/>
                 <a:sym typeface="Calibri"/>
               </a:rPr>
-              <a:t>This work is licensed under the Creative Commons Attribution-NonCommercial-NoDerivatives 4.0 International License. </a:t>
-            </a:r>
-          </a:p>
-          <a:p>
-            <a:pPr lvl="0" algn="ctr">
-              <a:defRPr sz="1800"/>
-            </a:pPr>
-            <a:r>
-              <a:rPr sz="600" dirty="0">
-                <a:latin typeface="Avenir Light"/>
+              <a:t>Nachzulesen unter:</a:t>
+            </a:r>
+            <a:r>
+              <a:rPr sz="800" dirty="0">
+                <a:solidFill>
+                  <a:schemeClr val="tx1">
+                    <a:lumMod val="65000"/>
+                    <a:lumOff val="35000"/>
+                  </a:schemeClr>
+                </a:solidFill>
+                <a:latin typeface="Avenir Book" panose="02000503020000020003" pitchFamily="2" charset="0"/>
                 <a:ea typeface="Calibri"/>
                 <a:cs typeface="Avenir Light"/>
                 <a:sym typeface="Calibri"/>
               </a:rPr>
-              <a:t>To view a copy of this license, visit http://creativecommons.org/licenses/by-nc-nd/4.0/.</a:t>
-            </a:r>
+              <a:t> </a:t>
+            </a:r>
+            <a:r>
+              <a:rPr lang="de-DE" sz="800" dirty="0">
+                <a:solidFill>
+                  <a:schemeClr val="tx1">
+                    <a:lumMod val="65000"/>
+                    <a:lumOff val="35000"/>
+                  </a:schemeClr>
+                </a:solidFill>
+                <a:latin typeface="Avenir Book" panose="02000503020000020003" pitchFamily="2" charset="0"/>
+                <a:ea typeface="Calibri"/>
+                <a:cs typeface="Avenir Light"/>
+                <a:sym typeface="Calibri"/>
+              </a:rPr>
+              <a:t>https://</a:t>
+            </a:r>
+            <a:r>
+              <a:rPr lang="de-DE" sz="800" dirty="0" err="1">
+                <a:solidFill>
+                  <a:schemeClr val="tx1">
+                    <a:lumMod val="65000"/>
+                    <a:lumOff val="35000"/>
+                  </a:schemeClr>
+                </a:solidFill>
+                <a:latin typeface="Avenir Book" panose="02000503020000020003" pitchFamily="2" charset="0"/>
+                <a:ea typeface="Calibri"/>
+                <a:cs typeface="Avenir Light"/>
+                <a:sym typeface="Calibri"/>
+              </a:rPr>
+              <a:t>creativecommons.org</a:t>
+            </a:r>
+            <a:r>
+              <a:rPr lang="de-DE" sz="800" dirty="0">
+                <a:solidFill>
+                  <a:schemeClr val="tx1">
+                    <a:lumMod val="65000"/>
+                    <a:lumOff val="35000"/>
+                  </a:schemeClr>
+                </a:solidFill>
+                <a:latin typeface="Avenir Book" panose="02000503020000020003" pitchFamily="2" charset="0"/>
+                <a:ea typeface="Calibri"/>
+                <a:cs typeface="Avenir Light"/>
+                <a:sym typeface="Calibri"/>
+              </a:rPr>
+              <a:t>/</a:t>
+            </a:r>
+            <a:r>
+              <a:rPr lang="de-DE" sz="800" dirty="0" err="1">
+                <a:solidFill>
+                  <a:schemeClr val="tx1">
+                    <a:lumMod val="65000"/>
+                    <a:lumOff val="35000"/>
+                  </a:schemeClr>
+                </a:solidFill>
+                <a:latin typeface="Avenir Book" panose="02000503020000020003" pitchFamily="2" charset="0"/>
+                <a:ea typeface="Calibri"/>
+                <a:cs typeface="Avenir Light"/>
+                <a:sym typeface="Calibri"/>
+              </a:rPr>
+              <a:t>licenses</a:t>
+            </a:r>
+            <a:r>
+              <a:rPr lang="de-DE" sz="800" dirty="0">
+                <a:solidFill>
+                  <a:schemeClr val="tx1">
+                    <a:lumMod val="65000"/>
+                    <a:lumOff val="35000"/>
+                  </a:schemeClr>
+                </a:solidFill>
+                <a:latin typeface="Avenir Book" panose="02000503020000020003" pitchFamily="2" charset="0"/>
+                <a:ea typeface="Calibri"/>
+                <a:cs typeface="Avenir Light"/>
+                <a:sym typeface="Calibri"/>
+              </a:rPr>
+              <a:t>/</a:t>
+            </a:r>
+            <a:r>
+              <a:rPr lang="de-DE" sz="800" dirty="0" err="1">
+                <a:solidFill>
+                  <a:schemeClr val="tx1">
+                    <a:lumMod val="65000"/>
+                    <a:lumOff val="35000"/>
+                  </a:schemeClr>
+                </a:solidFill>
+                <a:latin typeface="Avenir Book" panose="02000503020000020003" pitchFamily="2" charset="0"/>
+                <a:ea typeface="Calibri"/>
+                <a:cs typeface="Avenir Light"/>
+                <a:sym typeface="Calibri"/>
+              </a:rPr>
+              <a:t>by-nc</a:t>
+            </a:r>
+            <a:r>
+              <a:rPr lang="de-DE" sz="800" dirty="0">
+                <a:solidFill>
+                  <a:schemeClr val="tx1">
+                    <a:lumMod val="65000"/>
+                    <a:lumOff val="35000"/>
+                  </a:schemeClr>
+                </a:solidFill>
+                <a:latin typeface="Avenir Book" panose="02000503020000020003" pitchFamily="2" charset="0"/>
+                <a:ea typeface="Calibri"/>
+                <a:cs typeface="Avenir Light"/>
+                <a:sym typeface="Calibri"/>
+              </a:rPr>
+              <a:t>/4.0/</a:t>
+            </a:r>
+            <a:r>
+              <a:rPr lang="de-DE" sz="800" dirty="0" err="1">
+                <a:solidFill>
+                  <a:schemeClr val="tx1">
+                    <a:lumMod val="65000"/>
+                    <a:lumOff val="35000"/>
+                  </a:schemeClr>
+                </a:solidFill>
+                <a:latin typeface="Avenir Book" panose="02000503020000020003" pitchFamily="2" charset="0"/>
+                <a:ea typeface="Calibri"/>
+                <a:cs typeface="Avenir Light"/>
+                <a:sym typeface="Calibri"/>
+              </a:rPr>
+              <a:t>deed.de</a:t>
+            </a:r>
+            <a:endParaRPr sz="800" dirty="0">
+              <a:solidFill>
+                <a:schemeClr val="tx1">
+                  <a:lumMod val="65000"/>
+                  <a:lumOff val="35000"/>
+                </a:schemeClr>
+              </a:solidFill>
+              <a:latin typeface="Avenir Book" panose="02000503020000020003" pitchFamily="2" charset="0"/>
+              <a:ea typeface="Calibri"/>
+              <a:cs typeface="Avenir Light"/>
+              <a:sym typeface="Calibri"/>
+            </a:endParaRPr>
           </a:p>
         </p:txBody>
       </p:sp>
       <p:pic>
         <p:nvPicPr>
-          <p:cNvPr id="6" name="pasted-image.tif"/>
+          <p:cNvPr id="8" name="pasted-image.tif">
+            <a:extLst>
+              <a:ext uri="{FF2B5EF4-FFF2-40B4-BE49-F238E27FC236}">
+                <a16:creationId xmlns:a16="http://schemas.microsoft.com/office/drawing/2014/main" id="{1C004275-A990-89ED-863D-0B76BFA3951C}"/>
+              </a:ext>
+            </a:extLst>
+          </p:cNvPr>
           <p:cNvPicPr/>
           <p:nvPr userDrawn="1"/>
         </p:nvPicPr>
-        <p:blipFill>
+        <p:blipFill rotWithShape="1">
           <a:blip r:embed="rId4"/>
-          <a:stretch>
-            <a:fillRect/>
-          </a:stretch>
+          <a:srcRect r="24777" b="-3233"/>
+          <a:stretch/>
         </p:blipFill>
         <p:spPr>
           <a:xfrm>
-            <a:off x="6174185" y="4992838"/>
-            <a:ext cx="886619" cy="214128"/>
+            <a:off x="5724347" y="4733926"/>
+            <a:ext cx="1009828" cy="333374"/>
           </a:xfrm>
           <a:prstGeom prst="rect">
             <a:avLst/>
@@ -593,58 +818,6 @@
           </a:ln>
         </p:spPr>
       </p:pic>
-      <p:sp>
-        <p:nvSpPr>
-          <p:cNvPr id="7" name="Textfeld 6"/>
-          <p:cNvSpPr txBox="1"/>
-          <p:nvPr userDrawn="1"/>
-        </p:nvSpPr>
-        <p:spPr>
-          <a:xfrm>
-            <a:off x="239285" y="4936890"/>
-            <a:ext cx="1044856" cy="276999"/>
-          </a:xfrm>
-          <a:prstGeom prst="rect">
-            <a:avLst/>
-          </a:prstGeom>
-          <a:noFill/>
-        </p:spPr>
-        <p:txBody>
-          <a:bodyPr wrap="square" rtlCol="0">
-            <a:spAutoFit/>
-          </a:bodyPr>
-          <a:lstStyle/>
-          <a:p>
-            <a:r>
-              <a:rPr lang="de-DE" sz="600" dirty="0">
-                <a:solidFill>
-                  <a:srgbClr val="5D5E5F"/>
-                </a:solidFill>
-                <a:latin typeface="Avenir Light"/>
-                <a:cs typeface="Avenir Light"/>
-              </a:rPr>
-              <a:t>Letzte Änderung: </a:t>
-            </a:r>
-            <a:fld id="{7A8C7DAC-E536-564C-B5B3-90E8FAB50562}" type="datetime1">
-              <a:rPr lang="de-DE" sz="600" smtClean="0">
-                <a:solidFill>
-                  <a:srgbClr val="5D5E5F"/>
-                </a:solidFill>
-                <a:latin typeface="Avenir Light"/>
-                <a:cs typeface="Avenir Light"/>
-              </a:rPr>
-              <a:t>20.07.23</a:t>
-            </a:fld>
-            <a:endParaRPr lang="de-DE" sz="600" dirty="0">
-              <a:solidFill>
-                <a:srgbClr val="5D5E5F"/>
-              </a:solidFill>
-              <a:latin typeface="Avenir Light"/>
-              <a:cs typeface="Avenir Light"/>
-            </a:endParaRPr>
-          </a:p>
-        </p:txBody>
-      </p:sp>
     </p:spTree>
     <p:extLst>
       <p:ext uri="{BB962C8B-B14F-4D97-AF65-F5344CB8AC3E}">
@@ -714,7 +887,7 @@
           <a:p>
             <a:fld id="{FF5B2BAF-DF38-0A48-A798-0C06E514FD52}" type="datetimeFigureOut">
               <a:rPr lang="de-DE" smtClean="0"/>
-              <a:t>20.07.23</a:t>
+              <a:t>27.07.23</a:t>
             </a:fld>
             <a:endParaRPr lang="de-DE" dirty="0"/>
           </a:p>
@@ -934,7 +1107,7 @@
           <a:p>
             <a:fld id="{FF5B2BAF-DF38-0A48-A798-0C06E514FD52}" type="datetimeFigureOut">
               <a:rPr lang="de-DE" smtClean="0"/>
-              <a:t>20.07.23</a:t>
+              <a:t>27.07.23</a:t>
             </a:fld>
             <a:endParaRPr lang="de-DE" dirty="0"/>
           </a:p>

</xml_diff>